<commit_message>
minor changes to slide deck
</commit_message>
<xml_diff>
--- a/docs/6-18-15 Experimental Metadata Concepts and Models.pptx
+++ b/docs/6-18-15 Experimental Metadata Concepts and Models.pptx
@@ -217,7 +217,7 @@
           <a:p>
             <a:fld id="{71AD69D2-EED3-4E08-8DD5-CB0E9BE5F784}" type="datetimeFigureOut">
               <a:rPr lang="en-US" smtClean="0"/>
-              <a:t>6/24/2015</a:t>
+              <a:t>7/17/2015</a:t>
             </a:fld>
             <a:endParaRPr lang="en-US"/>
           </a:p>
@@ -4102,7 +4102,7 @@
           <a:p>
             <a:fld id="{0FEFD010-BDE6-4174-AF26-08349E6F5D9F}" type="datetimeFigureOut">
               <a:rPr lang="en-US" smtClean="0"/>
-              <a:t>6/24/2015</a:t>
+              <a:t>7/17/2015</a:t>
             </a:fld>
             <a:endParaRPr lang="en-US"/>
           </a:p>
@@ -4272,7 +4272,7 @@
           <a:p>
             <a:fld id="{0FEFD010-BDE6-4174-AF26-08349E6F5D9F}" type="datetimeFigureOut">
               <a:rPr lang="en-US" smtClean="0"/>
-              <a:t>6/24/2015</a:t>
+              <a:t>7/17/2015</a:t>
             </a:fld>
             <a:endParaRPr lang="en-US"/>
           </a:p>
@@ -4452,7 +4452,7 @@
           <a:p>
             <a:fld id="{0FEFD010-BDE6-4174-AF26-08349E6F5D9F}" type="datetimeFigureOut">
               <a:rPr lang="en-US" smtClean="0"/>
-              <a:t>6/24/2015</a:t>
+              <a:t>7/17/2015</a:t>
             </a:fld>
             <a:endParaRPr lang="en-US"/>
           </a:p>
@@ -4622,7 +4622,7 @@
           <a:p>
             <a:fld id="{0FEFD010-BDE6-4174-AF26-08349E6F5D9F}" type="datetimeFigureOut">
               <a:rPr lang="en-US" smtClean="0"/>
-              <a:t>6/24/2015</a:t>
+              <a:t>7/17/2015</a:t>
             </a:fld>
             <a:endParaRPr lang="en-US"/>
           </a:p>
@@ -4868,7 +4868,7 @@
           <a:p>
             <a:fld id="{0FEFD010-BDE6-4174-AF26-08349E6F5D9F}" type="datetimeFigureOut">
               <a:rPr lang="en-US" smtClean="0"/>
-              <a:t>6/24/2015</a:t>
+              <a:t>7/17/2015</a:t>
             </a:fld>
             <a:endParaRPr lang="en-US"/>
           </a:p>
@@ -5156,7 +5156,7 @@
           <a:p>
             <a:fld id="{0FEFD010-BDE6-4174-AF26-08349E6F5D9F}" type="datetimeFigureOut">
               <a:rPr lang="en-US" smtClean="0"/>
-              <a:t>6/24/2015</a:t>
+              <a:t>7/17/2015</a:t>
             </a:fld>
             <a:endParaRPr lang="en-US"/>
           </a:p>
@@ -5578,7 +5578,7 @@
           <a:p>
             <a:fld id="{0FEFD010-BDE6-4174-AF26-08349E6F5D9F}" type="datetimeFigureOut">
               <a:rPr lang="en-US" smtClean="0"/>
-              <a:t>6/24/2015</a:t>
+              <a:t>7/17/2015</a:t>
             </a:fld>
             <a:endParaRPr lang="en-US"/>
           </a:p>
@@ -5696,7 +5696,7 @@
           <a:p>
             <a:fld id="{0FEFD010-BDE6-4174-AF26-08349E6F5D9F}" type="datetimeFigureOut">
               <a:rPr lang="en-US" smtClean="0"/>
-              <a:t>6/24/2015</a:t>
+              <a:t>7/17/2015</a:t>
             </a:fld>
             <a:endParaRPr lang="en-US"/>
           </a:p>
@@ -5791,7 +5791,7 @@
           <a:p>
             <a:fld id="{0FEFD010-BDE6-4174-AF26-08349E6F5D9F}" type="datetimeFigureOut">
               <a:rPr lang="en-US" smtClean="0"/>
-              <a:t>6/24/2015</a:t>
+              <a:t>7/17/2015</a:t>
             </a:fld>
             <a:endParaRPr lang="en-US"/>
           </a:p>
@@ -6068,7 +6068,7 @@
           <a:p>
             <a:fld id="{0FEFD010-BDE6-4174-AF26-08349E6F5D9F}" type="datetimeFigureOut">
               <a:rPr lang="en-US" smtClean="0"/>
-              <a:t>6/24/2015</a:t>
+              <a:t>7/17/2015</a:t>
             </a:fld>
             <a:endParaRPr lang="en-US"/>
           </a:p>
@@ -6321,7 +6321,7 @@
           <a:p>
             <a:fld id="{0FEFD010-BDE6-4174-AF26-08349E6F5D9F}" type="datetimeFigureOut">
               <a:rPr lang="en-US" smtClean="0"/>
-              <a:t>6/24/2015</a:t>
+              <a:t>7/17/2015</a:t>
             </a:fld>
             <a:endParaRPr lang="en-US"/>
           </a:p>
@@ -6534,7 +6534,7 @@
           <a:p>
             <a:fld id="{0FEFD010-BDE6-4174-AF26-08349E6F5D9F}" type="datetimeFigureOut">
               <a:rPr lang="en-US" smtClean="0"/>
-              <a:t>6/24/2015</a:t>
+              <a:t>7/17/2015</a:t>
             </a:fld>
             <a:endParaRPr lang="en-US"/>
           </a:p>
@@ -7566,15 +7566,7 @@
             </a:pPr>
             <a:r>
               <a:rPr lang="en-US" sz="2400" dirty="0" smtClean="0"/>
-              <a:t>(Same </a:t>
-            </a:r>
-            <a:r>
-              <a:rPr lang="en-US" sz="2400" dirty="0" smtClean="0"/>
-              <a:t>concepts </a:t>
-            </a:r>
-            <a:r>
-              <a:rPr lang="en-US" sz="2400" dirty="0" smtClean="0"/>
-              <a:t>organized to optimize </a:t>
+              <a:t>(Same concepts organized to optimize </a:t>
             </a:r>
             <a:r>
               <a:rPr lang="en-US" sz="2400" dirty="0"/>
@@ -9124,11 +9116,7 @@
           <a:p>
             <a:r>
               <a:rPr lang="en-US" dirty="0" smtClean="0"/>
-              <a:t>Model </a:t>
-            </a:r>
-            <a:r>
-              <a:rPr lang="en-US" dirty="0" smtClean="0"/>
-              <a:t>Walk-Through</a:t>
+              <a:t>Model Walk-Through</a:t>
             </a:r>
             <a:endParaRPr lang="en-US" dirty="0"/>
           </a:p>
@@ -11254,15 +11242,7 @@
             </a:pPr>
             <a:r>
               <a:rPr lang="en-US" dirty="0" smtClean="0"/>
-              <a:t>Be </a:t>
-            </a:r>
-            <a:r>
-              <a:rPr lang="en-US" dirty="0" smtClean="0"/>
-              <a:t>matured </a:t>
-            </a:r>
-            <a:r>
-              <a:rPr lang="en-US" dirty="0" smtClean="0"/>
-              <a:t>into a </a:t>
+              <a:t>Be matured into a </a:t>
             </a:r>
             <a:r>
               <a:rPr lang="en-US" dirty="0"/>
@@ -14144,11 +14124,7 @@
             </a:pPr>
             <a:r>
               <a:rPr lang="en-US" sz="2400" b="1" dirty="0" smtClean="0"/>
-              <a:t>Relatively flat, </a:t>
-            </a:r>
-            <a:r>
-              <a:rPr lang="en-US" sz="2400" b="1" dirty="0" smtClean="0"/>
-              <a:t>majority of elements are domain neutral.</a:t>
+              <a:t>Relatively flat, majority of elements are domain neutral.</a:t>
             </a:r>
           </a:p>
           <a:p>
@@ -14163,15 +14139,7 @@
             </a:r>
             <a:r>
               <a:rPr lang="en-US" sz="2400" b="1" dirty="0" smtClean="0"/>
-              <a:t>use and </a:t>
-            </a:r>
-            <a:r>
-              <a:rPr lang="en-US" sz="2400" b="1" dirty="0" smtClean="0"/>
-              <a:t>specifications </a:t>
-            </a:r>
-            <a:r>
-              <a:rPr lang="en-US" sz="2400" b="1" dirty="0" smtClean="0"/>
-              <a:t>to follow</a:t>
+              <a:t>use and specifications to follow</a:t>
             </a:r>
           </a:p>
           <a:p>
@@ -15013,17 +14981,7 @@
                 <a:latin typeface="Courier New" panose="02070309020205020404" pitchFamily="49" charset="0"/>
                 <a:cs typeface="Courier New" panose="02070309020205020404" pitchFamily="49" charset="0"/>
               </a:rPr>
-              <a:t>“Find datasets that measure the effect of chemical stress on </a:t>
-            </a:r>
-            <a:r>
-              <a:rPr lang="en-US" sz="2400" b="1" i="1" dirty="0" smtClean="0">
-                <a:solidFill>
-                  <a:srgbClr val="00B050"/>
-                </a:solidFill>
-                <a:latin typeface="Courier New" panose="02070309020205020404" pitchFamily="49" charset="0"/>
-                <a:cs typeface="Courier New" panose="02070309020205020404" pitchFamily="49" charset="0"/>
-              </a:rPr>
-              <a:t>neural activity in zebrafish”</a:t>
+              <a:t>“Find datasets that measure the effect of chemical stress on neural activity in zebrafish”</a:t>
             </a:r>
             <a:endParaRPr lang="en-US" sz="2400" b="1" i="1" dirty="0">
               <a:solidFill>
@@ -15132,15 +15090,7 @@
                   <a:srgbClr val="CA3202"/>
                 </a:solidFill>
               </a:rPr>
-              <a:t>coped or Structured for </a:t>
-            </a:r>
-            <a:r>
-              <a:rPr lang="en-US" sz="3000" b="1" i="1" dirty="0" smtClean="0">
-                <a:solidFill>
-                  <a:srgbClr val="CA3202"/>
-                </a:solidFill>
-              </a:rPr>
-              <a:t>Our Discovery </a:t>
+              <a:t>coped or Structured for Our Discovery </a:t>
             </a:r>
             <a:r>
               <a:rPr lang="en-US" sz="3000" b="1" i="1" dirty="0">
@@ -15286,11 +15236,11 @@
             </a:r>
             <a:r>
               <a:rPr lang="en-US" dirty="0" smtClean="0"/>
-              <a:t>and the </a:t>
+              <a:t>as is the RDF </a:t>
             </a:r>
             <a:r>
               <a:rPr lang="en-US" dirty="0" smtClean="0"/>
-              <a:t>RDF translation of their model </a:t>
+              <a:t>translation of their model </a:t>
             </a:r>
             <a:r>
               <a:rPr lang="en-US" dirty="0"/>
@@ -15302,7 +15252,7 @@
             </a:r>
             <a:r>
               <a:rPr lang="en-US" dirty="0" smtClean="0"/>
-              <a:t>is not fully developed.</a:t>
+              <a:t>.</a:t>
             </a:r>
             <a:endParaRPr lang="en-US" dirty="0"/>
           </a:p>
@@ -15421,7 +15371,31 @@
                   <a:srgbClr val="C00000"/>
                 </a:solidFill>
               </a:rPr>
-              <a:t>None fit the bill with respect to scope</a:t>
+              <a:t>None </a:t>
+            </a:r>
+            <a:r>
+              <a:rPr lang="en-US" sz="2400" b="1" dirty="0" smtClean="0">
+                <a:solidFill>
+                  <a:srgbClr val="C00000"/>
+                </a:solidFill>
+              </a:rPr>
+              <a:t>meet our needs w.r.t.</a:t>
+            </a:r>
+            <a:r>
+              <a:rPr lang="en-US" sz="2400" b="1" dirty="0" smtClean="0">
+                <a:solidFill>
+                  <a:srgbClr val="C00000"/>
+                </a:solidFill>
+              </a:rPr>
+              <a:t> </a:t>
+            </a:r>
+            <a:r>
+              <a:rPr lang="en-US" sz="2400" b="1" dirty="0" smtClean="0">
+                <a:solidFill>
+                  <a:srgbClr val="C00000"/>
+                </a:solidFill>
+              </a:rPr>
+              <a:t>scope</a:t>
             </a:r>
             <a:r>
               <a:rPr lang="en-US" sz="2400" b="1" dirty="0">
@@ -15429,8 +15403,21 @@
                   <a:srgbClr val="C00000"/>
                 </a:solidFill>
               </a:rPr>
-              <a:t>, complexity, focus, integration, and constraints on metadata specification.</a:t>
-            </a:r>
+              <a:t>, complexity, focus, integration, and constraints on metadata </a:t>
+            </a:r>
+            <a:r>
+              <a:rPr lang="en-US" sz="2400" b="1" dirty="0" smtClean="0">
+                <a:solidFill>
+                  <a:srgbClr val="C00000"/>
+                </a:solidFill>
+              </a:rPr>
+              <a:t>specification</a:t>
+            </a:r>
+            <a:endParaRPr lang="en-US" sz="2400" b="1" dirty="0">
+              <a:solidFill>
+                <a:srgbClr val="C00000"/>
+              </a:solidFill>
+            </a:endParaRPr>
           </a:p>
         </p:txBody>
       </p:sp>

</xml_diff>